<commit_message>
fix reference to exercise number
</commit_message>
<xml_diff>
--- a/docker/03_Images.pptx
+++ b/docker/03_Images.pptx
@@ -9810,8 +9810,12 @@
           <a:lstStyle/>
           <a:p>
             <a:r>
+              <a:rPr lang="en-US"/>
+              <a:t>Exercise #3 </a:t>
+            </a:r>
+            <a:r>
               <a:rPr lang="en-US" dirty="0"/>
-              <a:t>Exercise #4 – Images</a:t>
+              <a:t>– Images</a:t>
             </a:r>
           </a:p>
         </p:txBody>

</xml_diff>

<commit_message>
fix image layer names
</commit_message>
<xml_diff>
--- a/docker/03_Images.pptx
+++ b/docker/03_Images.pptx
@@ -20431,10 +20431,10 @@
         </p:nvGrpSpPr>
         <p:grpSpPr>
           <a:xfrm>
-            <a:off x="4841966" y="1615987"/>
-            <a:ext cx="5947954" cy="3896539"/>
-            <a:chOff x="4693920" y="1694364"/>
-            <a:chExt cx="5947954" cy="3896539"/>
+            <a:off x="4841966" y="1615988"/>
+            <a:ext cx="5947954" cy="3365446"/>
+            <a:chOff x="4693920" y="1694365"/>
+            <a:chExt cx="5947954" cy="3365446"/>
           </a:xfrm>
         </p:grpSpPr>
         <p:sp>
@@ -20451,8 +20451,8 @@
           </p:nvSpPr>
           <p:spPr bwMode="gray">
             <a:xfrm>
-              <a:off x="4693920" y="1694364"/>
-              <a:ext cx="5947954" cy="3896539"/>
+              <a:off x="4693920" y="1694365"/>
+              <a:ext cx="5947954" cy="3365446"/>
             </a:xfrm>
             <a:prstGeom prst="rect">
               <a:avLst/>
@@ -20538,7 +20538,7 @@
           <p:spPr bwMode="gray">
             <a:xfrm>
               <a:off x="4920343" y="2718929"/>
-              <a:ext cx="5495108" cy="2645551"/>
+              <a:ext cx="5495108" cy="2095221"/>
             </a:xfrm>
             <a:prstGeom prst="rect">
               <a:avLst/>
@@ -20618,108 +20618,6 @@
           </p:nvSpPr>
           <p:spPr bwMode="gray">
             <a:xfrm>
-              <a:off x="5329646" y="4730608"/>
-              <a:ext cx="4972594" cy="496389"/>
-            </a:xfrm>
-            <a:prstGeom prst="rect">
-              <a:avLst/>
-            </a:prstGeom>
-            <a:solidFill>
-              <a:schemeClr val="accent2">
-                <a:lumMod val="75000"/>
-              </a:schemeClr>
-            </a:solidFill>
-            <a:ln w="6350" algn="ctr">
-              <a:solidFill>
-                <a:schemeClr val="tx1"/>
-              </a:solidFill>
-              <a:miter lim="800000"/>
-              <a:headEnd/>
-              <a:tailEnd/>
-            </a:ln>
-          </p:spPr>
-          <p:txBody>
-            <a:bodyPr lIns="90000" tIns="72000" rIns="90000" bIns="72000" rtlCol="0" anchor="ctr"/>
-            <a:lstStyle/>
-            <a:p>
-              <a:pPr marR="0" algn="ctr" defTabSz="914400" eaLnBrk="1" fontAlgn="base" latinLnBrk="0" hangingPunct="1">
-                <a:lnSpc>
-                  <a:spcPct val="100000"/>
-                </a:lnSpc>
-                <a:spcBef>
-                  <a:spcPct val="50000"/>
-                </a:spcBef>
-                <a:spcAft>
-                  <a:spcPct val="0"/>
-                </a:spcAft>
-                <a:buClr>
-                  <a:srgbClr val="F0AB00"/>
-                </a:buClr>
-                <a:buSzPct val="80000"/>
-                <a:tabLst/>
-              </a:pPr>
-              <a:r>
-                <a:rPr kumimoji="0" lang="en-US" sz="1800" b="0" i="0" u="none" strike="noStrike" kern="0" cap="none" spc="0" normalizeH="0" baseline="0" dirty="0">
-                  <a:ln>
-                    <a:noFill/>
-                  </a:ln>
-                  <a:solidFill>
-                    <a:schemeClr val="bg1"/>
-                  </a:solidFill>
-                  <a:effectLst/>
-                  <a:uLnTx/>
-                  <a:uFillTx/>
-                  <a:ea typeface="Arial Unicode MS" pitchFamily="34" charset="-128"/>
-                  <a:cs typeface="Arial Unicode MS" pitchFamily="34" charset="-128"/>
-                </a:rPr>
-                <a:t>Base Image</a:t>
-              </a:r>
-              <a:r>
-                <a:rPr kumimoji="0" lang="en-US" sz="1800" b="0" i="0" u="none" strike="noStrike" kern="0" cap="none" spc="0" normalizeH="0" dirty="0">
-                  <a:ln>
-                    <a:noFill/>
-                  </a:ln>
-                  <a:solidFill>
-                    <a:schemeClr val="bg1"/>
-                  </a:solidFill>
-                  <a:effectLst/>
-                  <a:uLnTx/>
-                  <a:uFillTx/>
-                  <a:ea typeface="Arial Unicode MS" pitchFamily="34" charset="-128"/>
-                  <a:cs typeface="Arial Unicode MS" pitchFamily="34" charset="-128"/>
-                </a:rPr>
-                <a:t> (e.g. Debian)</a:t>
-              </a:r>
-              <a:endParaRPr kumimoji="0" lang="en-US" sz="1800" b="0" i="0" u="none" strike="noStrike" kern="0" cap="none" spc="0" normalizeH="0" baseline="0" dirty="0">
-                <a:ln>
-                  <a:noFill/>
-                </a:ln>
-                <a:solidFill>
-                  <a:schemeClr val="bg1"/>
-                </a:solidFill>
-                <a:effectLst/>
-                <a:uLnTx/>
-                <a:uFillTx/>
-                <a:ea typeface="Arial Unicode MS" pitchFamily="34" charset="-128"/>
-                <a:cs typeface="Arial Unicode MS" pitchFamily="34" charset="-128"/>
-              </a:endParaRPr>
-            </a:p>
-          </p:txBody>
-        </p:sp>
-        <p:sp>
-          <p:nvSpPr>
-            <p:cNvPr id="18" name="Rectangle 17">
-              <a:extLst>
-                <a:ext uri="{FF2B5EF4-FFF2-40B4-BE49-F238E27FC236}">
-                  <a16:creationId xmlns:a16="http://schemas.microsoft.com/office/drawing/2014/main" id="{9A253E9F-4801-4888-96F6-7478CB4FA707}"/>
-                </a:ext>
-              </a:extLst>
-            </p:cNvPr>
-            <p:cNvSpPr/>
-            <p:nvPr/>
-          </p:nvSpPr>
-          <p:spPr bwMode="gray">
-            <a:xfrm>
               <a:off x="5329646" y="4103591"/>
               <a:ext cx="4972594" cy="496389"/>
             </a:xfrm>
@@ -20744,10 +20642,7 @@
             <a:bodyPr lIns="90000" tIns="72000" rIns="90000" bIns="72000" rtlCol="0" anchor="ctr"/>
             <a:lstStyle/>
             <a:p>
-              <a:pPr marR="0" algn="ctr" defTabSz="914400" eaLnBrk="1" fontAlgn="base" latinLnBrk="0" hangingPunct="1">
-                <a:lnSpc>
-                  <a:spcPct val="100000"/>
-                </a:lnSpc>
+              <a:pPr algn="ctr" defTabSz="914400" fontAlgn="base">
                 <a:spcBef>
                   <a:spcPct val="50000"/>
                 </a:spcBef>
@@ -20758,37 +20653,35 @@
                   <a:srgbClr val="F0AB00"/>
                 </a:buClr>
                 <a:buSzPct val="80000"/>
-                <a:tabLst/>
               </a:pPr>
               <a:r>
-                <a:rPr kumimoji="0" lang="en-US" sz="1800" b="0" i="0" u="none" strike="noStrike" kern="0" cap="none" spc="0" normalizeH="0" baseline="0" dirty="0" err="1">
-                  <a:ln>
-                    <a:noFill/>
-                  </a:ln>
+                <a:rPr lang="en-US" sz="1800" kern="0" dirty="0">
                   <a:solidFill>
                     <a:schemeClr val="bg1"/>
                   </a:solidFill>
-                  <a:effectLst/>
-                  <a:uLnTx/>
-                  <a:uFillTx/>
+                  <a:ea typeface="Arial Unicode MS" pitchFamily="34" charset="-128"/>
+                </a:rPr>
+                <a:t>Base Image (e.g. </a:t>
+              </a:r>
+              <a:r>
+                <a:rPr lang="en-US" sz="1800" kern="0" dirty="0" err="1">
+                  <a:solidFill>
+                    <a:schemeClr val="bg1"/>
+                  </a:solidFill>
                   <a:ea typeface="Arial Unicode MS" pitchFamily="34" charset="-128"/>
                   <a:cs typeface="Arial Unicode MS" pitchFamily="34" charset="-128"/>
                 </a:rPr>
                 <a:t>Busybox</a:t>
               </a:r>
-              <a:endParaRPr kumimoji="0" lang="en-US" sz="1800" b="0" i="0" u="none" strike="noStrike" kern="0" cap="none" spc="0" normalizeH="0" baseline="0" dirty="0">
-                <a:ln>
-                  <a:noFill/>
-                </a:ln>
-                <a:solidFill>
-                  <a:schemeClr val="bg1"/>
-                </a:solidFill>
-                <a:effectLst/>
-                <a:uLnTx/>
-                <a:uFillTx/>
-                <a:ea typeface="Arial Unicode MS" pitchFamily="34" charset="-128"/>
-                <a:cs typeface="Arial Unicode MS" pitchFamily="34" charset="-128"/>
-              </a:endParaRPr>
+              <a:r>
+                <a:rPr lang="en-US" sz="1800" kern="0" dirty="0">
+                  <a:solidFill>
+                    <a:schemeClr val="bg1"/>
+                  </a:solidFill>
+                  <a:ea typeface="Arial Unicode MS" pitchFamily="34" charset="-128"/>
+                </a:rPr>
+                <a:t>)</a:t>
+              </a:r>
             </a:p>
           </p:txBody>
         </p:sp>

</xml_diff>